<commit_message>
Code was refactored, added select and all sockets changed on non-blocking
</commit_message>
<xml_diff>
--- a/Defense of project.pptx
+++ b/Defense of project.pptx
@@ -304,7 +304,7 @@
             <a:pPr algn="r">
               <a:buNone/>
             </a:pPr>
-            <a:fld id="{E8493C11-2C09-4F1F-A6BE-4BDC95B28B78}" type="slidenum">
+            <a:fld id="{756CF9E0-B563-4996-B29D-F8F0D9C84107}" type="slidenum">
               <a:rPr b="0" lang="en-US" sz="1400" spc="-1" strike="noStrike">
                 <a:latin typeface="Times New Roman"/>
               </a:rPr>
@@ -352,7 +352,7 @@
         <p:spPr>
           <a:xfrm>
             <a:off x="380880" y="685800"/>
-            <a:ext cx="6094440" cy="3427560"/>
+            <a:ext cx="6094080" cy="3427200"/>
           </a:xfrm>
           <a:prstGeom prst="rect">
             <a:avLst/>
@@ -375,7 +375,7 @@
         <p:spPr>
           <a:xfrm>
             <a:off x="685800" y="4343400"/>
-            <a:ext cx="5484960" cy="4113360"/>
+            <a:ext cx="5484600" cy="4113000"/>
           </a:xfrm>
           <a:prstGeom prst="rect">
             <a:avLst/>
@@ -409,7 +409,7 @@
         <p:spPr>
           <a:xfrm>
             <a:off x="3884760" y="8685360"/>
-            <a:ext cx="2970360" cy="455760"/>
+            <a:ext cx="2970000" cy="455400"/>
           </a:xfrm>
           <a:prstGeom prst="rect">
             <a:avLst/>
@@ -445,7 +445,7 @@
               </a:lnSpc>
               <a:buNone/>
             </a:pPr>
-            <a:fld id="{D0B100C4-2481-446D-973D-044362C738E1}" type="slidenum">
+            <a:fld id="{8F3EF93F-A9DB-4AD4-B211-BFEBB9EB5A57}" type="slidenum">
               <a:rPr b="0" lang="ru-RU" sz="1200" spc="-1" strike="noStrike">
                 <a:solidFill>
                   <a:srgbClr val="000000"/>
@@ -453,7 +453,7 @@
                 <a:latin typeface="+mn-lt"/>
                 <a:ea typeface="+mn-ea"/>
               </a:rPr>
-              <a:t>8</a:t>
+              <a:t>&lt;number&gt;</a:t>
             </a:fld>
             <a:endParaRPr b="0" lang="en-US" sz="1200" spc="-1" strike="noStrike">
               <a:latin typeface="Times New Roman"/>
@@ -496,7 +496,7 @@
         <p:spPr>
           <a:xfrm>
             <a:off x="380880" y="685800"/>
-            <a:ext cx="6094440" cy="3427560"/>
+            <a:ext cx="6094080" cy="3427200"/>
           </a:xfrm>
           <a:prstGeom prst="rect">
             <a:avLst/>
@@ -519,7 +519,7 @@
         <p:spPr>
           <a:xfrm>
             <a:off x="685800" y="4343400"/>
-            <a:ext cx="5484960" cy="4113360"/>
+            <a:ext cx="5484600" cy="4113000"/>
           </a:xfrm>
           <a:prstGeom prst="rect">
             <a:avLst/>
@@ -553,7 +553,7 @@
         <p:spPr>
           <a:xfrm>
             <a:off x="3884760" y="8685360"/>
-            <a:ext cx="2970360" cy="455760"/>
+            <a:ext cx="2970000" cy="455400"/>
           </a:xfrm>
           <a:prstGeom prst="rect">
             <a:avLst/>
@@ -589,7 +589,7 @@
               </a:lnSpc>
               <a:buNone/>
             </a:pPr>
-            <a:fld id="{1E5A0D0F-684D-4835-B0D2-5DE8FE1B2802}" type="slidenum">
+            <a:fld id="{EFDE94BC-47F2-4ADD-BD21-380062FCFBB9}" type="slidenum">
               <a:rPr b="0" lang="ru-RU" sz="1200" spc="-1" strike="noStrike">
                 <a:solidFill>
                   <a:srgbClr val="000000"/>
@@ -597,7 +597,7 @@
                 <a:latin typeface="+mn-lt"/>
                 <a:ea typeface="+mn-ea"/>
               </a:rPr>
-              <a:t>8</a:t>
+              <a:t>&lt;number&gt;</a:t>
             </a:fld>
             <a:endParaRPr b="0" lang="en-US" sz="1200" spc="-1" strike="noStrike">
               <a:latin typeface="Times New Roman"/>
@@ -640,7 +640,7 @@
         <p:spPr>
           <a:xfrm>
             <a:off x="380880" y="685800"/>
-            <a:ext cx="6094440" cy="3427560"/>
+            <a:ext cx="6094080" cy="3427200"/>
           </a:xfrm>
           <a:prstGeom prst="rect">
             <a:avLst/>
@@ -663,7 +663,7 @@
         <p:spPr>
           <a:xfrm>
             <a:off x="685800" y="4343400"/>
-            <a:ext cx="5484960" cy="4113360"/>
+            <a:ext cx="5484600" cy="4113000"/>
           </a:xfrm>
           <a:prstGeom prst="rect">
             <a:avLst/>
@@ -697,7 +697,7 @@
         <p:spPr>
           <a:xfrm>
             <a:off x="3884760" y="8685360"/>
-            <a:ext cx="2970360" cy="455760"/>
+            <a:ext cx="2970000" cy="455400"/>
           </a:xfrm>
           <a:prstGeom prst="rect">
             <a:avLst/>
@@ -733,7 +733,7 @@
               </a:lnSpc>
               <a:buNone/>
             </a:pPr>
-            <a:fld id="{66E99ADC-7515-497F-9B1C-D3DE9E3CBC6A}" type="slidenum">
+            <a:fld id="{6A6EFCF6-222B-4475-98D0-C9A5B73C5BC1}" type="slidenum">
               <a:rPr b="0" lang="ru-RU" sz="1200" spc="-1" strike="noStrike">
                 <a:solidFill>
                   <a:srgbClr val="000000"/>
@@ -741,7 +741,7 @@
                 <a:latin typeface="+mn-lt"/>
                 <a:ea typeface="+mn-ea"/>
               </a:rPr>
-              <a:t>8</a:t>
+              <a:t>&lt;number&gt;</a:t>
             </a:fld>
             <a:endParaRPr b="0" lang="en-US" sz="1200" spc="-1" strike="noStrike">
               <a:latin typeface="Times New Roman"/>
@@ -784,7 +784,7 @@
         <p:spPr>
           <a:xfrm>
             <a:off x="380880" y="685800"/>
-            <a:ext cx="6094440" cy="3427560"/>
+            <a:ext cx="6094080" cy="3427200"/>
           </a:xfrm>
           <a:prstGeom prst="rect">
             <a:avLst/>
@@ -807,7 +807,7 @@
         <p:spPr>
           <a:xfrm>
             <a:off x="685800" y="4343400"/>
-            <a:ext cx="5484960" cy="4113360"/>
+            <a:ext cx="5484600" cy="4113000"/>
           </a:xfrm>
           <a:prstGeom prst="rect">
             <a:avLst/>
@@ -841,7 +841,7 @@
         <p:spPr>
           <a:xfrm>
             <a:off x="3884760" y="8685360"/>
-            <a:ext cx="2970360" cy="455760"/>
+            <a:ext cx="2970000" cy="455400"/>
           </a:xfrm>
           <a:prstGeom prst="rect">
             <a:avLst/>
@@ -877,7 +877,7 @@
               </a:lnSpc>
               <a:buNone/>
             </a:pPr>
-            <a:fld id="{55750384-D032-4C6D-BEDF-08D78A8BBD65}" type="slidenum">
+            <a:fld id="{FB385C8C-7E65-4146-A319-C772753957C7}" type="slidenum">
               <a:rPr b="0" lang="ru-RU" sz="1200" spc="-1" strike="noStrike">
                 <a:solidFill>
                   <a:srgbClr val="000000"/>
@@ -885,7 +885,7 @@
                 <a:latin typeface="+mn-lt"/>
                 <a:ea typeface="+mn-ea"/>
               </a:rPr>
-              <a:t>8</a:t>
+              <a:t>&lt;number&gt;</a:t>
             </a:fld>
             <a:endParaRPr b="0" lang="en-US" sz="1200" spc="-1" strike="noStrike">
               <a:latin typeface="Times New Roman"/>
@@ -928,7 +928,7 @@
         <p:spPr>
           <a:xfrm>
             <a:off x="380880" y="685800"/>
-            <a:ext cx="6094440" cy="3427560"/>
+            <a:ext cx="6094080" cy="3427200"/>
           </a:xfrm>
           <a:prstGeom prst="rect">
             <a:avLst/>
@@ -951,7 +951,7 @@
         <p:spPr>
           <a:xfrm>
             <a:off x="685800" y="4343400"/>
-            <a:ext cx="5484960" cy="4113360"/>
+            <a:ext cx="5484600" cy="4113000"/>
           </a:xfrm>
           <a:prstGeom prst="rect">
             <a:avLst/>
@@ -985,7 +985,7 @@
         <p:spPr>
           <a:xfrm>
             <a:off x="3884760" y="8685360"/>
-            <a:ext cx="2970360" cy="455760"/>
+            <a:ext cx="2970000" cy="455400"/>
           </a:xfrm>
           <a:prstGeom prst="rect">
             <a:avLst/>
@@ -1021,7 +1021,7 @@
               </a:lnSpc>
               <a:buNone/>
             </a:pPr>
-            <a:fld id="{964D3CD3-ED62-4A98-82B2-E7097E837F14}" type="slidenum">
+            <a:fld id="{DB3D8EB4-78EA-485C-8094-49C97B98EEDA}" type="slidenum">
               <a:rPr b="0" lang="ru-RU" sz="1200" spc="-1" strike="noStrike">
                 <a:solidFill>
                   <a:srgbClr val="000000"/>
@@ -1029,7 +1029,7 @@
                 <a:latin typeface="+mn-lt"/>
                 <a:ea typeface="+mn-ea"/>
               </a:rPr>
-              <a:t>8</a:t>
+              <a:t>&lt;number&gt;</a:t>
             </a:fld>
             <a:endParaRPr b="0" lang="en-US" sz="1200" spc="-1" strike="noStrike">
               <a:latin typeface="Times New Roman"/>
@@ -1072,7 +1072,7 @@
         <p:spPr>
           <a:xfrm>
             <a:off x="380880" y="685800"/>
-            <a:ext cx="6094440" cy="3427560"/>
+            <a:ext cx="6094080" cy="3427200"/>
           </a:xfrm>
           <a:prstGeom prst="rect">
             <a:avLst/>
@@ -1095,7 +1095,7 @@
         <p:spPr>
           <a:xfrm>
             <a:off x="685800" y="4343400"/>
-            <a:ext cx="5484960" cy="4113360"/>
+            <a:ext cx="5484600" cy="4113000"/>
           </a:xfrm>
           <a:prstGeom prst="rect">
             <a:avLst/>
@@ -1129,7 +1129,7 @@
         <p:spPr>
           <a:xfrm>
             <a:off x="3884760" y="8685360"/>
-            <a:ext cx="2970360" cy="455760"/>
+            <a:ext cx="2970000" cy="455400"/>
           </a:xfrm>
           <a:prstGeom prst="rect">
             <a:avLst/>
@@ -1165,7 +1165,7 @@
               </a:lnSpc>
               <a:buNone/>
             </a:pPr>
-            <a:fld id="{51D3BF4C-76B2-4231-A401-B280BD8D4AB6}" type="slidenum">
+            <a:fld id="{3B2588D4-719C-4AD0-9D71-00ADE385F620}" type="slidenum">
               <a:rPr b="0" lang="ru-RU" sz="1200" spc="-1" strike="noStrike">
                 <a:solidFill>
                   <a:srgbClr val="000000"/>
@@ -1216,7 +1216,7 @@
         <p:spPr>
           <a:xfrm>
             <a:off x="380880" y="685800"/>
-            <a:ext cx="6094440" cy="3427560"/>
+            <a:ext cx="6094080" cy="3427200"/>
           </a:xfrm>
           <a:prstGeom prst="rect">
             <a:avLst/>
@@ -1239,7 +1239,7 @@
         <p:spPr>
           <a:xfrm>
             <a:off x="685800" y="4343400"/>
-            <a:ext cx="5484960" cy="4113360"/>
+            <a:ext cx="5484600" cy="4113000"/>
           </a:xfrm>
           <a:prstGeom prst="rect">
             <a:avLst/>
@@ -1273,7 +1273,7 @@
         <p:spPr>
           <a:xfrm>
             <a:off x="3884760" y="8685360"/>
-            <a:ext cx="2970360" cy="455760"/>
+            <a:ext cx="2970000" cy="455400"/>
           </a:xfrm>
           <a:prstGeom prst="rect">
             <a:avLst/>
@@ -1309,7 +1309,7 @@
               </a:lnSpc>
               <a:buNone/>
             </a:pPr>
-            <a:fld id="{07C935C8-27F7-4730-8364-B688B8C5B441}" type="slidenum">
+            <a:fld id="{C3F44F95-93FD-4574-8E26-AC16350B3E71}" type="slidenum">
               <a:rPr b="0" lang="ru-RU" sz="1200" spc="-1" strike="noStrike">
                 <a:solidFill>
                   <a:srgbClr val="000000"/>
@@ -1360,7 +1360,7 @@
         <p:spPr>
           <a:xfrm>
             <a:off x="380880" y="685800"/>
-            <a:ext cx="6094440" cy="3427560"/>
+            <a:ext cx="6094080" cy="3427200"/>
           </a:xfrm>
           <a:prstGeom prst="rect">
             <a:avLst/>
@@ -1383,7 +1383,7 @@
         <p:spPr>
           <a:xfrm>
             <a:off x="685800" y="4343400"/>
-            <a:ext cx="5484960" cy="4113360"/>
+            <a:ext cx="5484600" cy="4113000"/>
           </a:xfrm>
           <a:prstGeom prst="rect">
             <a:avLst/>
@@ -1417,7 +1417,7 @@
         <p:spPr>
           <a:xfrm>
             <a:off x="3884760" y="8685360"/>
-            <a:ext cx="2970360" cy="455760"/>
+            <a:ext cx="2970000" cy="455400"/>
           </a:xfrm>
           <a:prstGeom prst="rect">
             <a:avLst/>
@@ -1453,7 +1453,7 @@
               </a:lnSpc>
               <a:buNone/>
             </a:pPr>
-            <a:fld id="{E974588A-8F29-4173-9EDD-ECD1F79EC22F}" type="slidenum">
+            <a:fld id="{288098A3-912C-4F38-ABE8-B2BA0FC6C0B2}" type="slidenum">
               <a:rPr b="0" lang="ru-RU" sz="1200" spc="-1" strike="noStrike">
                 <a:solidFill>
                   <a:srgbClr val="000000"/>
@@ -1525,7 +1525,7 @@
         <p:txBody>
           <a:bodyPr/>
           <a:p>
-            <a:fld id="{190565A2-7C80-4485-8206-AA40B54CD71F}" type="slidenum">
+            <a:fld id="{6C8998F2-FDD3-4F16-A3CF-84972AA1272A}" type="slidenum">
               <a:t>&lt;#&gt;</a:t>
             </a:fld>
           </a:p>
@@ -1713,7 +1713,7 @@
         <p:txBody>
           <a:bodyPr/>
           <a:p>
-            <a:fld id="{8AB553EB-8879-4648-AEEC-8471DB1C990C}" type="slidenum">
+            <a:fld id="{B5291D80-5A14-4DB7-B419-9527771C03B8}" type="slidenum">
               <a:t>&lt;#&gt;</a:t>
             </a:fld>
           </a:p>
@@ -1969,7 +1969,7 @@
         <p:txBody>
           <a:bodyPr/>
           <a:p>
-            <a:fld id="{2466BD03-AFEB-48C5-B2D5-A5352E29BD8F}" type="slidenum">
+            <a:fld id="{E09095C2-BCF5-438A-910F-70DD64E6E5DA}" type="slidenum">
               <a:t>&lt;#&gt;</a:t>
             </a:fld>
           </a:p>
@@ -2293,7 +2293,7 @@
         <p:txBody>
           <a:bodyPr/>
           <a:p>
-            <a:fld id="{769DB43D-75F3-491E-BCCB-9B9C911B8DFF}" type="slidenum">
+            <a:fld id="{A2E84E17-D401-4864-8E67-24D0C7C23FAB}" type="slidenum">
               <a:t>&lt;#&gt;</a:t>
             </a:fld>
           </a:p>
@@ -2376,7 +2376,7 @@
         <p:txBody>
           <a:bodyPr/>
           <a:p>
-            <a:fld id="{4E5AE4FD-4DC7-4164-BE98-28A31BFE7893}" type="slidenum">
+            <a:fld id="{3E4D83D5-33BE-437F-80AD-0C064E1BDD10}" type="slidenum">
               <a:t>&lt;#&gt;</a:t>
             </a:fld>
           </a:p>
@@ -2533,7 +2533,7 @@
         <p:txBody>
           <a:bodyPr/>
           <a:p>
-            <a:fld id="{F18DB1C8-048B-412E-8024-08BA94A1C88C}" type="slidenum">
+            <a:fld id="{5BDD68DC-D235-4ED0-8DD1-C3F13CE80C3F}" type="slidenum">
               <a:t>&lt;#&gt;</a:t>
             </a:fld>
           </a:p>
@@ -2687,7 +2687,7 @@
         <p:txBody>
           <a:bodyPr/>
           <a:p>
-            <a:fld id="{A2799216-B1AF-4F1B-8C63-B999B9259B3B}" type="slidenum">
+            <a:fld id="{B7971BB8-E1CE-47F6-84F6-3983271DDEC2}" type="slidenum">
               <a:t>&lt;#&gt;</a:t>
             </a:fld>
           </a:p>
@@ -2875,7 +2875,7 @@
         <p:txBody>
           <a:bodyPr/>
           <a:p>
-            <a:fld id="{926C9BF5-71E5-4E0A-A7A3-31E5FD6F9221}" type="slidenum">
+            <a:fld id="{7B7AFF49-6751-40DD-8CFC-18FFA4C75F6B}" type="slidenum">
               <a:t>&lt;#&gt;</a:t>
             </a:fld>
           </a:p>
@@ -2995,7 +2995,7 @@
         <p:txBody>
           <a:bodyPr/>
           <a:p>
-            <a:fld id="{D006173F-F968-4A06-9E3B-0343BCDAB1C8}" type="slidenum">
+            <a:fld id="{A9D05A24-F717-47EE-88C2-72ABF35BBEB8}" type="slidenum">
               <a:t>&lt;#&gt;</a:t>
             </a:fld>
           </a:p>
@@ -3115,7 +3115,7 @@
         <p:txBody>
           <a:bodyPr/>
           <a:p>
-            <a:fld id="{C5794BBB-0A75-4267-9E96-AA4CFB905220}" type="slidenum">
+            <a:fld id="{38C0BAD0-22EB-43D8-947B-BFBFA5AF0B8A}" type="slidenum">
               <a:t>&lt;#&gt;</a:t>
             </a:fld>
           </a:p>
@@ -3337,7 +3337,7 @@
         <p:txBody>
           <a:bodyPr/>
           <a:p>
-            <a:fld id="{F939FBF7-6DAF-4749-987D-2682BDE58D63}" type="slidenum">
+            <a:fld id="{861E1110-225A-4E83-B03D-5B293A94EA67}" type="slidenum">
               <a:t>&lt;#&gt;</a:t>
             </a:fld>
           </a:p>
@@ -3494,7 +3494,7 @@
         <p:txBody>
           <a:bodyPr/>
           <a:p>
-            <a:fld id="{E7D32629-9830-4D64-9C6F-313E140AA27F}" type="slidenum">
+            <a:fld id="{0C7A59BD-FA12-43FA-810B-4725A41C9BA0}" type="slidenum">
               <a:t>&lt;#&gt;</a:t>
             </a:fld>
           </a:p>
@@ -3716,7 +3716,7 @@
         <p:txBody>
           <a:bodyPr/>
           <a:p>
-            <a:fld id="{9FC1AEA9-0D91-49DD-B7A9-B5227E9340DF}" type="slidenum">
+            <a:fld id="{1D21B5C1-7A5B-4359-902F-55F3F579B3F7}" type="slidenum">
               <a:t>&lt;#&gt;</a:t>
             </a:fld>
           </a:p>
@@ -3938,7 +3938,7 @@
         <p:txBody>
           <a:bodyPr/>
           <a:p>
-            <a:fld id="{115F6CAE-C154-4258-916E-606450A89C6D}" type="slidenum">
+            <a:fld id="{920BF2BA-E0C5-476F-AEC4-A903C17390A1}" type="slidenum">
               <a:t>&lt;#&gt;</a:t>
             </a:fld>
           </a:p>
@@ -4126,7 +4126,7 @@
         <p:txBody>
           <a:bodyPr/>
           <a:p>
-            <a:fld id="{9090A529-5B79-41C0-99D1-746E8406C1C6}" type="slidenum">
+            <a:fld id="{22094A0B-152D-4C83-B641-2BA9EB25EDED}" type="slidenum">
               <a:t>&lt;#&gt;</a:t>
             </a:fld>
           </a:p>
@@ -4382,7 +4382,7 @@
         <p:txBody>
           <a:bodyPr/>
           <a:p>
-            <a:fld id="{7B1F27B0-C5C2-4AB1-AEB7-9C6B3B5333AF}" type="slidenum">
+            <a:fld id="{FCC33C2E-FA67-4374-A2D0-D52A7969A450}" type="slidenum">
               <a:t>&lt;#&gt;</a:t>
             </a:fld>
           </a:p>
@@ -4706,7 +4706,7 @@
         <p:txBody>
           <a:bodyPr/>
           <a:p>
-            <a:fld id="{9F2C5CCB-F3D2-4372-9046-58D3FE0A685C}" type="slidenum">
+            <a:fld id="{32FF9585-46FC-47DA-8AE4-5AC02493191B}" type="slidenum">
               <a:t>&lt;#&gt;</a:t>
             </a:fld>
           </a:p>
@@ -4789,7 +4789,7 @@
         <p:txBody>
           <a:bodyPr/>
           <a:p>
-            <a:fld id="{52DC937E-8534-4BFA-AD42-B425A516D669}" type="slidenum">
+            <a:fld id="{C5B424BB-8343-4696-AA50-B3904FE31336}" type="slidenum">
               <a:t>&lt;#&gt;</a:t>
             </a:fld>
           </a:p>
@@ -4946,7 +4946,7 @@
         <p:txBody>
           <a:bodyPr/>
           <a:p>
-            <a:fld id="{435FFC17-C488-43C4-9FD9-8DA3127AA877}" type="slidenum">
+            <a:fld id="{6408F639-1B25-4F67-832C-2054C3DEB344}" type="slidenum">
               <a:t>&lt;#&gt;</a:t>
             </a:fld>
           </a:p>
@@ -5100,7 +5100,7 @@
         <p:txBody>
           <a:bodyPr/>
           <a:p>
-            <a:fld id="{8324C05C-6611-4118-BE71-EC642C9422BD}" type="slidenum">
+            <a:fld id="{05454ADA-F45B-4EB7-AE06-05A440EB27D2}" type="slidenum">
               <a:t>&lt;#&gt;</a:t>
             </a:fld>
           </a:p>
@@ -5288,7 +5288,7 @@
         <p:txBody>
           <a:bodyPr/>
           <a:p>
-            <a:fld id="{57E3F277-1D80-4262-A2AD-5EC9D037E6CF}" type="slidenum">
+            <a:fld id="{2220922A-2B65-45A7-AADF-95A04FE759CC}" type="slidenum">
               <a:t>&lt;#&gt;</a:t>
             </a:fld>
           </a:p>
@@ -5408,7 +5408,7 @@
         <p:txBody>
           <a:bodyPr/>
           <a:p>
-            <a:fld id="{F9BB7F11-5A65-4070-BD91-09B1B307C5D9}" type="slidenum">
+            <a:fld id="{FD96E354-1733-44D0-9059-2BC7F67C6567}" type="slidenum">
               <a:t>&lt;#&gt;</a:t>
             </a:fld>
           </a:p>
@@ -5562,7 +5562,7 @@
         <p:txBody>
           <a:bodyPr/>
           <a:p>
-            <a:fld id="{218B532E-0726-434D-B3C8-9B3E3F4D1CDF}" type="slidenum">
+            <a:fld id="{B2AB9191-B4E3-42D8-8282-22C7963DEF52}" type="slidenum">
               <a:t>&lt;#&gt;</a:t>
             </a:fld>
           </a:p>
@@ -5682,7 +5682,7 @@
         <p:txBody>
           <a:bodyPr/>
           <a:p>
-            <a:fld id="{8A6C160A-4B14-4E64-8041-F9EF896F6584}" type="slidenum">
+            <a:fld id="{0CC9BE0D-5CB8-40B7-B6BB-A3F8AA5E6FE7}" type="slidenum">
               <a:t>&lt;#&gt;</a:t>
             </a:fld>
           </a:p>
@@ -5904,7 +5904,7 @@
         <p:txBody>
           <a:bodyPr/>
           <a:p>
-            <a:fld id="{FE561771-966D-4618-9F8E-25373AF16489}" type="slidenum">
+            <a:fld id="{F7E06460-CA24-4A30-9F4C-934D200039E3}" type="slidenum">
               <a:t>&lt;#&gt;</a:t>
             </a:fld>
           </a:p>
@@ -6126,7 +6126,7 @@
         <p:txBody>
           <a:bodyPr/>
           <a:p>
-            <a:fld id="{7340EEA4-CDAC-42FC-BF60-6554C3B247F4}" type="slidenum">
+            <a:fld id="{7C22A3D7-AA90-42FE-9142-03F7AB16EE7C}" type="slidenum">
               <a:t>&lt;#&gt;</a:t>
             </a:fld>
           </a:p>
@@ -6348,7 +6348,7 @@
         <p:txBody>
           <a:bodyPr/>
           <a:p>
-            <a:fld id="{1AF1B087-2AB7-4035-BC19-03E507A5B370}" type="slidenum">
+            <a:fld id="{1016D7A9-02FE-487C-8DD1-021A8EDF0262}" type="slidenum">
               <a:t>&lt;#&gt;</a:t>
             </a:fld>
           </a:p>
@@ -6536,7 +6536,7 @@
         <p:txBody>
           <a:bodyPr/>
           <a:p>
-            <a:fld id="{489C3017-CED0-4D2B-9B92-57D3104C2C5F}" type="slidenum">
+            <a:fld id="{E4BB6A1D-AA82-4397-8386-19EBA8386198}" type="slidenum">
               <a:t>&lt;#&gt;</a:t>
             </a:fld>
           </a:p>
@@ -6792,7 +6792,7 @@
         <p:txBody>
           <a:bodyPr/>
           <a:p>
-            <a:fld id="{8CF576E2-6C3A-4880-A375-D3DEEC10DD31}" type="slidenum">
+            <a:fld id="{F5037936-C70E-4CB3-B07B-46867EF7271C}" type="slidenum">
               <a:t>&lt;#&gt;</a:t>
             </a:fld>
           </a:p>
@@ -7116,7 +7116,7 @@
         <p:txBody>
           <a:bodyPr/>
           <a:p>
-            <a:fld id="{CB5B2B76-AB0F-44BA-AFEA-4AEC3AF4D611}" type="slidenum">
+            <a:fld id="{8FC27175-44D0-4C4D-8C5A-E45F04186748}" type="slidenum">
               <a:t>&lt;#&gt;</a:t>
             </a:fld>
           </a:p>
@@ -7199,7 +7199,7 @@
         <p:txBody>
           <a:bodyPr/>
           <a:p>
-            <a:fld id="{D8A01C8B-88EE-4D98-A9D6-C87BE7ED75D8}" type="slidenum">
+            <a:fld id="{8B261B98-4F6A-4351-840D-D9DEB09F74C4}" type="slidenum">
               <a:t>&lt;#&gt;</a:t>
             </a:fld>
           </a:p>
@@ -7356,7 +7356,7 @@
         <p:txBody>
           <a:bodyPr/>
           <a:p>
-            <a:fld id="{E4ADE991-6C7D-4A9D-AEE8-AF31CCF712CA}" type="slidenum">
+            <a:fld id="{73F4C107-C682-465D-8019-11841EFE2A62}" type="slidenum">
               <a:t>&lt;#&gt;</a:t>
             </a:fld>
           </a:p>
@@ -7510,7 +7510,7 @@
         <p:txBody>
           <a:bodyPr/>
           <a:p>
-            <a:fld id="{37B1E909-A1CE-4D20-AC41-150DE051A1F2}" type="slidenum">
+            <a:fld id="{A2F2920A-F001-4D9A-96F6-95DDDF22EA0F}" type="slidenum">
               <a:t>&lt;#&gt;</a:t>
             </a:fld>
           </a:p>
@@ -7698,7 +7698,7 @@
         <p:txBody>
           <a:bodyPr/>
           <a:p>
-            <a:fld id="{42B9DC63-C89C-4BAA-AF5F-23B1A6499C2F}" type="slidenum">
+            <a:fld id="{BA546C78-269C-43A4-A8B6-11F96A636F40}" type="slidenum">
               <a:t>&lt;#&gt;</a:t>
             </a:fld>
           </a:p>
@@ -7886,7 +7886,7 @@
         <p:txBody>
           <a:bodyPr/>
           <a:p>
-            <a:fld id="{0F16AD38-EF76-436D-91A7-083887C11268}" type="slidenum">
+            <a:fld id="{8B2EA523-473E-4003-9DDB-83DDF3397B88}" type="slidenum">
               <a:t>&lt;#&gt;</a:t>
             </a:fld>
           </a:p>
@@ -8006,7 +8006,7 @@
         <p:txBody>
           <a:bodyPr/>
           <a:p>
-            <a:fld id="{13A6D423-1AD0-4CE5-80CB-7E6BAF79BA70}" type="slidenum">
+            <a:fld id="{9E2841BF-A70F-414E-B4BB-CCC6F1E3057C}" type="slidenum">
               <a:t>&lt;#&gt;</a:t>
             </a:fld>
           </a:p>
@@ -8126,7 +8126,7 @@
         <p:txBody>
           <a:bodyPr/>
           <a:p>
-            <a:fld id="{FBD927D4-80A5-4E86-8D8C-7A279C296F08}" type="slidenum">
+            <a:fld id="{229EB70F-325A-430D-89C6-8E16AAE18F55}" type="slidenum">
               <a:t>&lt;#&gt;</a:t>
             </a:fld>
           </a:p>
@@ -8348,7 +8348,7 @@
         <p:txBody>
           <a:bodyPr/>
           <a:p>
-            <a:fld id="{EBFBA87C-6761-4626-9BF1-E1A91EE811DE}" type="slidenum">
+            <a:fld id="{43263C6D-79F0-4F1B-AC8D-BAF1FCC7F03F}" type="slidenum">
               <a:t>&lt;#&gt;</a:t>
             </a:fld>
           </a:p>
@@ -8570,7 +8570,7 @@
         <p:txBody>
           <a:bodyPr/>
           <a:p>
-            <a:fld id="{3F4B0083-E9A1-499D-8484-6D3A46FD95EE}" type="slidenum">
+            <a:fld id="{C7AE59FB-4E15-4E4A-9599-B664769AC320}" type="slidenum">
               <a:t>&lt;#&gt;</a:t>
             </a:fld>
           </a:p>
@@ -8792,7 +8792,7 @@
         <p:txBody>
           <a:bodyPr/>
           <a:p>
-            <a:fld id="{81116D3E-F8FE-4262-8DAB-BB4B7FAB0C2A}" type="slidenum">
+            <a:fld id="{6EE08046-B883-4F9E-B6BC-8A3BDFBE75E3}" type="slidenum">
               <a:t>&lt;#&gt;</a:t>
             </a:fld>
           </a:p>
@@ -8980,7 +8980,7 @@
         <p:txBody>
           <a:bodyPr/>
           <a:p>
-            <a:fld id="{FF7E5181-EB4A-466D-9B07-BC0A41CC6578}" type="slidenum">
+            <a:fld id="{7CE83EF9-D454-4D06-BB08-5426AC8BCF9D}" type="slidenum">
               <a:t>&lt;#&gt;</a:t>
             </a:fld>
           </a:p>
@@ -9236,7 +9236,7 @@
         <p:txBody>
           <a:bodyPr/>
           <a:p>
-            <a:fld id="{A34EAC8A-BE32-406B-A10B-AA4EDCA8D485}" type="slidenum">
+            <a:fld id="{458F59E1-13D4-4770-B607-521169E03680}" type="slidenum">
               <a:t>&lt;#&gt;</a:t>
             </a:fld>
           </a:p>
@@ -9560,7 +9560,7 @@
         <p:txBody>
           <a:bodyPr/>
           <a:p>
-            <a:fld id="{DCAA59F4-B84A-47C6-B43F-75C6BE801E83}" type="slidenum">
+            <a:fld id="{ECFA2966-9895-4865-BC5F-A9B68218F883}" type="slidenum">
               <a:t>&lt;#&gt;</a:t>
             </a:fld>
           </a:p>
@@ -9643,7 +9643,7 @@
         <p:txBody>
           <a:bodyPr/>
           <a:p>
-            <a:fld id="{F966E4B2-A2CD-4707-95AF-F2B514A41167}" type="slidenum">
+            <a:fld id="{513FE2F1-CDC7-4B14-918F-5016B8D7E387}" type="slidenum">
               <a:t>&lt;#&gt;</a:t>
             </a:fld>
           </a:p>
@@ -9763,7 +9763,7 @@
         <p:txBody>
           <a:bodyPr/>
           <a:p>
-            <a:fld id="{3C628423-E1A8-431F-967A-55A8D9D899BF}" type="slidenum">
+            <a:fld id="{2980DEE1-B451-48A1-8937-40B689A39B78}" type="slidenum">
               <a:t>&lt;#&gt;</a:t>
             </a:fld>
           </a:p>
@@ -9920,7 +9920,7 @@
         <p:txBody>
           <a:bodyPr/>
           <a:p>
-            <a:fld id="{6EBDF85B-B515-4DDA-B728-1FEB68EFD267}" type="slidenum">
+            <a:fld id="{345F662D-E51C-4B02-9DAE-CDF5901410A9}" type="slidenum">
               <a:t>&lt;#&gt;</a:t>
             </a:fld>
           </a:p>
@@ -10074,7 +10074,7 @@
         <p:txBody>
           <a:bodyPr/>
           <a:p>
-            <a:fld id="{D2C191F9-A59D-45D3-B92E-652085D1296B}" type="slidenum">
+            <a:fld id="{21206F12-EB44-4A65-83A1-57D5DA7001EF}" type="slidenum">
               <a:t>&lt;#&gt;</a:t>
             </a:fld>
           </a:p>
@@ -10262,7 +10262,7 @@
         <p:txBody>
           <a:bodyPr/>
           <a:p>
-            <a:fld id="{A15E4DA9-8714-4DCC-9976-B56DFAF49F2D}" type="slidenum">
+            <a:fld id="{8A4038ED-9A0B-4C56-8D2D-423E7CBBFD75}" type="slidenum">
               <a:t>&lt;#&gt;</a:t>
             </a:fld>
           </a:p>
@@ -10382,7 +10382,7 @@
         <p:txBody>
           <a:bodyPr/>
           <a:p>
-            <a:fld id="{A6B01CA5-C732-4552-97C1-B6CA9881D2F9}" type="slidenum">
+            <a:fld id="{DF36987A-BF51-4341-B3D5-F1D44A404021}" type="slidenum">
               <a:t>&lt;#&gt;</a:t>
             </a:fld>
           </a:p>
@@ -10502,7 +10502,7 @@
         <p:txBody>
           <a:bodyPr/>
           <a:p>
-            <a:fld id="{AEDF55DB-DA81-4181-B4AD-8C90510EF16D}" type="slidenum">
+            <a:fld id="{07FC27BA-E98F-4103-B370-D89E10F232F3}" type="slidenum">
               <a:t>&lt;#&gt;</a:t>
             </a:fld>
           </a:p>
@@ -10724,7 +10724,7 @@
         <p:txBody>
           <a:bodyPr/>
           <a:p>
-            <a:fld id="{F6D3283D-2929-4187-9293-B46607A29197}" type="slidenum">
+            <a:fld id="{61F1ED38-9D5E-4F52-B39E-6072D920D164}" type="slidenum">
               <a:t>&lt;#&gt;</a:t>
             </a:fld>
           </a:p>
@@ -10946,7 +10946,7 @@
         <p:txBody>
           <a:bodyPr/>
           <a:p>
-            <a:fld id="{5AF7960C-A7DB-478A-B229-534344292943}" type="slidenum">
+            <a:fld id="{ED579816-DF22-4A55-9E82-C62EB1D4E226}" type="slidenum">
               <a:t>&lt;#&gt;</a:t>
             </a:fld>
           </a:p>
@@ -11168,7 +11168,7 @@
         <p:txBody>
           <a:bodyPr/>
           <a:p>
-            <a:fld id="{7F61387F-686F-44E4-B4D5-F3039B1CB2AD}" type="slidenum">
+            <a:fld id="{421D3730-8B15-49C4-B07F-6EB9624FF34E}" type="slidenum">
               <a:t>&lt;#&gt;</a:t>
             </a:fld>
           </a:p>
@@ -11356,7 +11356,7 @@
         <p:txBody>
           <a:bodyPr/>
           <a:p>
-            <a:fld id="{F2C0331D-DDE5-43F2-B997-6402EF79C19E}" type="slidenum">
+            <a:fld id="{D309922D-DE8A-42DE-B0F0-3A00CC2C694E}" type="slidenum">
               <a:t>&lt;#&gt;</a:t>
             </a:fld>
           </a:p>
@@ -11612,7 +11612,7 @@
         <p:txBody>
           <a:bodyPr/>
           <a:p>
-            <a:fld id="{8375F00B-FC61-4DCD-AB22-0AF1A274E3C7}" type="slidenum">
+            <a:fld id="{E453111B-1F28-422E-AFF2-CC57EFF73DC8}" type="slidenum">
               <a:t>&lt;#&gt;</a:t>
             </a:fld>
           </a:p>
@@ -11732,7 +11732,7 @@
         <p:txBody>
           <a:bodyPr/>
           <a:p>
-            <a:fld id="{2181492D-B987-49CF-8F67-B99F34BAB5D3}" type="slidenum">
+            <a:fld id="{9E9AC70F-3EBE-4F47-B307-97F48686F8B7}" type="slidenum">
               <a:t>&lt;#&gt;</a:t>
             </a:fld>
           </a:p>
@@ -12056,7 +12056,7 @@
         <p:txBody>
           <a:bodyPr/>
           <a:p>
-            <a:fld id="{A1041A62-E44B-41D9-A623-1EC4335E1867}" type="slidenum">
+            <a:fld id="{1AE5AFC9-F541-474C-9EF6-7F8825931662}" type="slidenum">
               <a:t>&lt;#&gt;</a:t>
             </a:fld>
           </a:p>
@@ -12278,7 +12278,7 @@
         <p:txBody>
           <a:bodyPr/>
           <a:p>
-            <a:fld id="{2D98DC52-B4A0-4A29-AD1B-8C93B261BA2C}" type="slidenum">
+            <a:fld id="{01BB2C7F-FDA2-4EF9-B66B-8C57C5292E60}" type="slidenum">
               <a:t>&lt;#&gt;</a:t>
             </a:fld>
           </a:p>
@@ -12500,7 +12500,7 @@
         <p:txBody>
           <a:bodyPr/>
           <a:p>
-            <a:fld id="{3BC2FEFC-8F0B-48A1-8E3E-C4D1889A1FC1}" type="slidenum">
+            <a:fld id="{1B587EEC-2F12-4143-B602-9530231869D8}" type="slidenum">
               <a:t>&lt;#&gt;</a:t>
             </a:fld>
           </a:p>
@@ -12722,7 +12722,7 @@
         <p:txBody>
           <a:bodyPr/>
           <a:p>
-            <a:fld id="{430B571B-45B1-4BD0-8E61-CB365A5ACF0D}" type="slidenum">
+            <a:fld id="{52DC2331-1DD8-4A05-BD28-05408693E671}" type="slidenum">
               <a:t>&lt;#&gt;</a:t>
             </a:fld>
           </a:p>
@@ -12791,7 +12791,7 @@
         <p:spPr>
           <a:xfrm>
             <a:off x="3124080" y="4767120"/>
-            <a:ext cx="2894040" cy="272520"/>
+            <a:ext cx="2893680" cy="272160"/>
           </a:xfrm>
           <a:prstGeom prst="rect">
             <a:avLst/>
@@ -12848,7 +12848,7 @@
         <p:spPr>
           <a:xfrm>
             <a:off x="6553080" y="4767120"/>
-            <a:ext cx="2132280" cy="272520"/>
+            <a:ext cx="2131920" cy="272160"/>
           </a:xfrm>
           <a:prstGeom prst="rect">
             <a:avLst/>
@@ -12883,7 +12883,7 @@
               </a:lnSpc>
               <a:buNone/>
             </a:pPr>
-            <a:fld id="{02F5EE0D-E501-4E77-869F-78A69F0828B4}" type="slidenum">
+            <a:fld id="{D7898E2E-5F5A-40AD-AA9E-5C95E6E89FDE}" type="slidenum">
               <a:rPr b="0" lang="ru-RU" sz="1200" spc="-1" strike="noStrike">
                 <a:solidFill>
                   <a:srgbClr val="8b8b8b"/>
@@ -12911,7 +12911,7 @@
         <p:spPr>
           <a:xfrm>
             <a:off x="457200" y="4767120"/>
-            <a:ext cx="2132280" cy="272520"/>
+            <a:ext cx="2131920" cy="272160"/>
           </a:xfrm>
           <a:prstGeom prst="rect">
             <a:avLst/>
@@ -13228,7 +13228,7 @@
         <p:spPr>
           <a:xfrm>
             <a:off x="3124080" y="4767120"/>
-            <a:ext cx="2894040" cy="272520"/>
+            <a:ext cx="2893680" cy="272160"/>
           </a:xfrm>
           <a:prstGeom prst="rect">
             <a:avLst/>
@@ -13285,7 +13285,7 @@
         <p:spPr>
           <a:xfrm>
             <a:off x="6553080" y="4767120"/>
-            <a:ext cx="2132280" cy="272520"/>
+            <a:ext cx="2131920" cy="272160"/>
           </a:xfrm>
           <a:prstGeom prst="rect">
             <a:avLst/>
@@ -13320,7 +13320,7 @@
               </a:lnSpc>
               <a:buNone/>
             </a:pPr>
-            <a:fld id="{88BD3F32-B649-4ABE-A652-292A2C356D66}" type="slidenum">
+            <a:fld id="{F627688E-BAE5-4C62-93AE-5D944647E738}" type="slidenum">
               <a:rPr b="0" lang="ru-RU" sz="1200" spc="-1" strike="noStrike">
                 <a:solidFill>
                   <a:srgbClr val="8b8b8b"/>
@@ -13348,7 +13348,7 @@
         <p:spPr>
           <a:xfrm>
             <a:off x="457200" y="4767120"/>
-            <a:ext cx="2132280" cy="272520"/>
+            <a:ext cx="2131920" cy="272160"/>
           </a:xfrm>
           <a:prstGeom prst="rect">
             <a:avLst/>
@@ -13665,7 +13665,7 @@
         <p:spPr>
           <a:xfrm>
             <a:off x="3124080" y="4767120"/>
-            <a:ext cx="2894040" cy="272520"/>
+            <a:ext cx="2893680" cy="272160"/>
           </a:xfrm>
           <a:prstGeom prst="rect">
             <a:avLst/>
@@ -13722,7 +13722,7 @@
         <p:spPr>
           <a:xfrm>
             <a:off x="6553080" y="4767120"/>
-            <a:ext cx="2132280" cy="272520"/>
+            <a:ext cx="2131920" cy="272160"/>
           </a:xfrm>
           <a:prstGeom prst="rect">
             <a:avLst/>
@@ -13757,7 +13757,7 @@
               </a:lnSpc>
               <a:buNone/>
             </a:pPr>
-            <a:fld id="{91A8AEE1-B038-430F-AF89-4066E3E04462}" type="slidenum">
+            <a:fld id="{D0C280CC-6229-48C6-9463-F0BB971752DE}" type="slidenum">
               <a:rPr b="0" lang="ru-RU" sz="1200" spc="-1" strike="noStrike">
                 <a:solidFill>
                   <a:srgbClr val="8b8b8b"/>
@@ -13785,7 +13785,7 @@
         <p:spPr>
           <a:xfrm>
             <a:off x="457200" y="4767120"/>
-            <a:ext cx="2132280" cy="272520"/>
+            <a:ext cx="2131920" cy="272160"/>
           </a:xfrm>
           <a:prstGeom prst="rect">
             <a:avLst/>
@@ -14508,7 +14508,7 @@
         <p:spPr>
           <a:xfrm>
             <a:off x="3124080" y="4767120"/>
-            <a:ext cx="2894040" cy="272520"/>
+            <a:ext cx="2893680" cy="272160"/>
           </a:xfrm>
           <a:prstGeom prst="rect">
             <a:avLst/>
@@ -14565,7 +14565,7 @@
         <p:spPr>
           <a:xfrm>
             <a:off x="6553080" y="4767120"/>
-            <a:ext cx="2132280" cy="272520"/>
+            <a:ext cx="2131920" cy="272160"/>
           </a:xfrm>
           <a:prstGeom prst="rect">
             <a:avLst/>
@@ -14600,7 +14600,7 @@
               </a:lnSpc>
               <a:buNone/>
             </a:pPr>
-            <a:fld id="{E1EDC4FA-4753-4CDF-A0F5-C9DF25EBD86C}" type="slidenum">
+            <a:fld id="{F4E03FC6-7FF7-401D-B641-F0D88C128471}" type="slidenum">
               <a:rPr b="0" lang="ru-RU" sz="1200" spc="-1" strike="noStrike">
                 <a:solidFill>
                   <a:srgbClr val="8b8b8b"/>
@@ -14628,7 +14628,7 @@
         <p:spPr>
           <a:xfrm>
             <a:off x="457200" y="4767120"/>
-            <a:ext cx="2132280" cy="272520"/>
+            <a:ext cx="2131920" cy="272160"/>
           </a:xfrm>
           <a:prstGeom prst="rect">
             <a:avLst/>
@@ -14719,7 +14719,7 @@
         <p:spPr>
           <a:xfrm>
             <a:off x="3124080" y="4767120"/>
-            <a:ext cx="2894040" cy="272520"/>
+            <a:ext cx="2893680" cy="272160"/>
           </a:xfrm>
           <a:prstGeom prst="rect">
             <a:avLst/>
@@ -14776,7 +14776,7 @@
         <p:spPr>
           <a:xfrm>
             <a:off x="6553080" y="4767120"/>
-            <a:ext cx="2132280" cy="272520"/>
+            <a:ext cx="2131920" cy="272160"/>
           </a:xfrm>
           <a:prstGeom prst="rect">
             <a:avLst/>
@@ -14811,7 +14811,7 @@
               </a:lnSpc>
               <a:buNone/>
             </a:pPr>
-            <a:fld id="{7A68B899-FF07-493A-BDA6-41FE5884033B}" type="slidenum">
+            <a:fld id="{3B5017B9-42FF-412E-AD94-442AFBB0FD9C}" type="slidenum">
               <a:rPr b="0" lang="ru-RU" sz="1200" spc="-1" strike="noStrike">
                 <a:solidFill>
                   <a:srgbClr val="8b8b8b"/>
@@ -14839,7 +14839,7 @@
         <p:spPr>
           <a:xfrm>
             <a:off x="457200" y="4767120"/>
-            <a:ext cx="2132280" cy="272520"/>
+            <a:ext cx="2131920" cy="272160"/>
           </a:xfrm>
           <a:prstGeom prst="rect">
             <a:avLst/>
@@ -15150,7 +15150,7 @@
         <p:spPr>
           <a:xfrm>
             <a:off x="0" y="1800"/>
-            <a:ext cx="9142560" cy="5140440"/>
+            <a:ext cx="9142200" cy="5140080"/>
           </a:xfrm>
           <a:prstGeom prst="rect">
             <a:avLst/>
@@ -15173,7 +15173,7 @@
         <p:spPr>
           <a:xfrm>
             <a:off x="3996000" y="555480"/>
-            <a:ext cx="1150560" cy="1123560"/>
+            <a:ext cx="1150200" cy="1123200"/>
           </a:xfrm>
           <a:prstGeom prst="rect">
             <a:avLst/>
@@ -15192,7 +15192,7 @@
         <p:spPr>
           <a:xfrm>
             <a:off x="0" y="2372760"/>
-            <a:ext cx="9142560" cy="1004400"/>
+            <a:ext cx="9142200" cy="1004400"/>
           </a:xfrm>
           <a:prstGeom prst="rect">
             <a:avLst/>
@@ -15344,7 +15344,7 @@
         <p:spPr>
           <a:xfrm>
             <a:off x="0" y="824760"/>
-            <a:ext cx="3346560" cy="767880"/>
+            <a:ext cx="3346200" cy="767520"/>
           </a:xfrm>
           <a:prstGeom prst="rect">
             <a:avLst/>
@@ -15388,7 +15388,7 @@
         <p:spPr>
           <a:xfrm>
             <a:off x="3485880" y="1026720"/>
-            <a:ext cx="5255280" cy="363960"/>
+            <a:ext cx="5254920" cy="363600"/>
           </a:xfrm>
           <a:prstGeom prst="rect">
             <a:avLst/>
@@ -15440,7 +15440,7 @@
         <p:spPr>
           <a:xfrm>
             <a:off x="3485880" y="3213000"/>
-            <a:ext cx="5333040" cy="1489680"/>
+            <a:ext cx="5332680" cy="1489680"/>
           </a:xfrm>
           <a:prstGeom prst="rect">
             <a:avLst/>
@@ -15596,7 +15596,7 @@
         <p:spPr>
           <a:xfrm>
             <a:off x="574560" y="1061640"/>
-            <a:ext cx="2197440" cy="294480"/>
+            <a:ext cx="2197080" cy="294120"/>
           </a:xfrm>
           <a:prstGeom prst="rect">
             <a:avLst/>
@@ -15645,7 +15645,7 @@
         <p:spPr>
           <a:xfrm>
             <a:off x="0" y="1800"/>
-            <a:ext cx="9142560" cy="831240"/>
+            <a:ext cx="9142200" cy="830880"/>
           </a:xfrm>
           <a:prstGeom prst="rect">
             <a:avLst/>
@@ -15689,7 +15689,7 @@
         <p:spPr>
           <a:xfrm>
             <a:off x="899640" y="228960"/>
-            <a:ext cx="7343280" cy="363960"/>
+            <a:ext cx="7342920" cy="363600"/>
           </a:xfrm>
           <a:prstGeom prst="rect">
             <a:avLst/>
@@ -15745,7 +15745,7 @@
         <p:spPr>
           <a:xfrm>
             <a:off x="457200" y="1199880"/>
-            <a:ext cx="3885120" cy="1617840"/>
+            <a:ext cx="3884760" cy="1617480"/>
           </a:xfrm>
           <a:prstGeom prst="rect">
             <a:avLst/>
@@ -15798,7 +15798,7 @@
         <p:spPr>
           <a:xfrm>
             <a:off x="8279280" y="375120"/>
-            <a:ext cx="658080" cy="333000"/>
+            <a:ext cx="657720" cy="333000"/>
           </a:xfrm>
           <a:prstGeom prst="rect">
             <a:avLst/>
@@ -15871,7 +15871,7 @@
         <p:spPr>
           <a:xfrm>
             <a:off x="8279280" y="71280"/>
-            <a:ext cx="658080" cy="454680"/>
+            <a:ext cx="657720" cy="454680"/>
           </a:xfrm>
           <a:prstGeom prst="rect">
             <a:avLst/>
@@ -15984,7 +15984,7 @@
         <p:spPr>
           <a:xfrm>
             <a:off x="4671000" y="1607760"/>
-            <a:ext cx="4014720" cy="1820160"/>
+            <a:ext cx="4014360" cy="1819800"/>
           </a:xfrm>
           <a:prstGeom prst="rect">
             <a:avLst/>
@@ -16041,7 +16041,7 @@
         <p:spPr>
           <a:xfrm>
             <a:off x="556200" y="3181680"/>
-            <a:ext cx="4014720" cy="1617840"/>
+            <a:ext cx="4014360" cy="1617480"/>
           </a:xfrm>
           <a:prstGeom prst="rect">
             <a:avLst/>
@@ -16124,7 +16124,7 @@
         <p:spPr>
           <a:xfrm>
             <a:off x="0" y="1800"/>
-            <a:ext cx="9142560" cy="831240"/>
+            <a:ext cx="9142200" cy="830880"/>
           </a:xfrm>
           <a:prstGeom prst="rect">
             <a:avLst/>
@@ -16168,7 +16168,7 @@
         <p:spPr>
           <a:xfrm>
             <a:off x="899640" y="228960"/>
-            <a:ext cx="7343280" cy="363960"/>
+            <a:ext cx="7342920" cy="363600"/>
           </a:xfrm>
           <a:prstGeom prst="rect">
             <a:avLst/>
@@ -16220,7 +16220,7 @@
         <p:spPr>
           <a:xfrm>
             <a:off x="8279280" y="375120"/>
-            <a:ext cx="658080" cy="333000"/>
+            <a:ext cx="657720" cy="333000"/>
           </a:xfrm>
           <a:prstGeom prst="rect">
             <a:avLst/>
@@ -16293,7 +16293,7 @@
         <p:spPr>
           <a:xfrm>
             <a:off x="8279280" y="71280"/>
-            <a:ext cx="658080" cy="454680"/>
+            <a:ext cx="657720" cy="454680"/>
           </a:xfrm>
           <a:prstGeom prst="rect">
             <a:avLst/>
@@ -16406,7 +16406,7 @@
         <p:spPr>
           <a:xfrm>
             <a:off x="685800" y="1828800"/>
-            <a:ext cx="4014720" cy="1479960"/>
+            <a:ext cx="4014360" cy="1479600"/>
           </a:xfrm>
           <a:prstGeom prst="rect">
             <a:avLst/>
@@ -16472,7 +16472,7 @@
         <p:spPr>
           <a:xfrm>
             <a:off x="457200" y="834120"/>
-            <a:ext cx="8228160" cy="855720"/>
+            <a:ext cx="8227800" cy="855360"/>
           </a:xfrm>
           <a:prstGeom prst="rect">
             <a:avLst/>
@@ -16529,7 +16529,7 @@
         <p:spPr>
           <a:xfrm>
             <a:off x="5715000" y="2035080"/>
-            <a:ext cx="2973960" cy="2764440"/>
+            <a:ext cx="2973600" cy="2764080"/>
           </a:xfrm>
           <a:prstGeom prst="rect">
             <a:avLst/>
@@ -16595,7 +16595,7 @@
         <p:spPr>
           <a:xfrm>
             <a:off x="457200" y="3543480"/>
-            <a:ext cx="5256720" cy="1599120"/>
+            <a:ext cx="5256360" cy="1598760"/>
           </a:xfrm>
           <a:prstGeom prst="rect">
             <a:avLst/>
@@ -16701,7 +16701,7 @@
         <p:spPr>
           <a:xfrm>
             <a:off x="0" y="1800"/>
-            <a:ext cx="9142560" cy="831240"/>
+            <a:ext cx="9142200" cy="830880"/>
           </a:xfrm>
           <a:prstGeom prst="rect">
             <a:avLst/>
@@ -16745,7 +16745,7 @@
         <p:spPr>
           <a:xfrm>
             <a:off x="899640" y="228960"/>
-            <a:ext cx="7343280" cy="363960"/>
+            <a:ext cx="7342920" cy="363600"/>
           </a:xfrm>
           <a:prstGeom prst="rect">
             <a:avLst/>
@@ -16797,7 +16797,7 @@
         <p:spPr>
           <a:xfrm>
             <a:off x="8279280" y="375120"/>
-            <a:ext cx="658080" cy="333000"/>
+            <a:ext cx="657720" cy="333000"/>
           </a:xfrm>
           <a:prstGeom prst="rect">
             <a:avLst/>
@@ -16870,7 +16870,7 @@
         <p:spPr>
           <a:xfrm>
             <a:off x="8279280" y="71280"/>
-            <a:ext cx="658080" cy="454680"/>
+            <a:ext cx="657720" cy="454680"/>
           </a:xfrm>
           <a:prstGeom prst="rect">
             <a:avLst/>
@@ -16983,7 +16983,7 @@
         <p:spPr>
           <a:xfrm>
             <a:off x="457200" y="949320"/>
-            <a:ext cx="7542720" cy="3393000"/>
+            <a:ext cx="7542360" cy="3392640"/>
           </a:xfrm>
           <a:prstGeom prst="rect">
             <a:avLst/>
@@ -17163,7 +17163,7 @@
         <p:spPr>
           <a:xfrm>
             <a:off x="0" y="1800"/>
-            <a:ext cx="9142560" cy="831240"/>
+            <a:ext cx="9142200" cy="830880"/>
           </a:xfrm>
           <a:prstGeom prst="rect">
             <a:avLst/>
@@ -17212,7 +17212,7 @@
         <p:spPr>
           <a:xfrm>
             <a:off x="228600" y="1002600"/>
-            <a:ext cx="5413320" cy="2653920"/>
+            <a:ext cx="5412960" cy="2653560"/>
           </a:xfrm>
           <a:prstGeom prst="rect">
             <a:avLst/>
@@ -17231,7 +17231,7 @@
         <p:spPr>
           <a:xfrm>
             <a:off x="899640" y="228960"/>
-            <a:ext cx="7343280" cy="363960"/>
+            <a:ext cx="7342920" cy="363600"/>
           </a:xfrm>
           <a:prstGeom prst="rect">
             <a:avLst/>
@@ -17287,7 +17287,7 @@
         <p:spPr>
           <a:xfrm>
             <a:off x="5943600" y="1143000"/>
-            <a:ext cx="2643120" cy="3393000"/>
+            <a:ext cx="2642760" cy="3392640"/>
           </a:xfrm>
           <a:prstGeom prst="rect">
             <a:avLst/>
@@ -17340,7 +17340,7 @@
         <p:spPr>
           <a:xfrm>
             <a:off x="8279280" y="375120"/>
-            <a:ext cx="658080" cy="333000"/>
+            <a:ext cx="657720" cy="333000"/>
           </a:xfrm>
           <a:prstGeom prst="rect">
             <a:avLst/>
@@ -17413,7 +17413,7 @@
         <p:spPr>
           <a:xfrm>
             <a:off x="8279280" y="71280"/>
-            <a:ext cx="658080" cy="454680"/>
+            <a:ext cx="657720" cy="454680"/>
           </a:xfrm>
           <a:prstGeom prst="rect">
             <a:avLst/>
@@ -17552,7 +17552,7 @@
         <p:spPr>
           <a:xfrm>
             <a:off x="0" y="1800"/>
-            <a:ext cx="9142560" cy="831240"/>
+            <a:ext cx="9142200" cy="830880"/>
           </a:xfrm>
           <a:prstGeom prst="rect">
             <a:avLst/>
@@ -17600,7 +17600,7 @@
         <p:spPr>
           <a:xfrm>
             <a:off x="137160" y="148320"/>
-            <a:ext cx="551520" cy="538560"/>
+            <a:ext cx="551160" cy="538200"/>
           </a:xfrm>
           <a:prstGeom prst="rect">
             <a:avLst/>
@@ -17619,7 +17619,7 @@
         <p:spPr>
           <a:xfrm>
             <a:off x="899640" y="228960"/>
-            <a:ext cx="7343280" cy="363960"/>
+            <a:ext cx="7342920" cy="363600"/>
           </a:xfrm>
           <a:prstGeom prst="rect">
             <a:avLst/>
@@ -17675,7 +17675,7 @@
         <p:spPr>
           <a:xfrm>
             <a:off x="7878240" y="367560"/>
-            <a:ext cx="352080" cy="352080"/>
+            <a:ext cx="351720" cy="351720"/>
           </a:xfrm>
           <a:prstGeom prst="rect">
             <a:avLst/>
@@ -17698,7 +17698,7 @@
         <p:spPr>
           <a:xfrm>
             <a:off x="7928640" y="114840"/>
-            <a:ext cx="250560" cy="250560"/>
+            <a:ext cx="250200" cy="250200"/>
           </a:xfrm>
           <a:prstGeom prst="rect">
             <a:avLst/>
@@ -17717,7 +17717,7 @@
         <p:spPr>
           <a:xfrm>
             <a:off x="8279280" y="375120"/>
-            <a:ext cx="658080" cy="333000"/>
+            <a:ext cx="657720" cy="333000"/>
           </a:xfrm>
           <a:prstGeom prst="rect">
             <a:avLst/>
@@ -17790,7 +17790,7 @@
         <p:spPr>
           <a:xfrm>
             <a:off x="8279280" y="71280"/>
-            <a:ext cx="658080" cy="454680"/>
+            <a:ext cx="657720" cy="454680"/>
           </a:xfrm>
           <a:prstGeom prst="rect">
             <a:avLst/>
@@ -17903,7 +17903,7 @@
         <p:spPr>
           <a:xfrm>
             <a:off x="6732360" y="185040"/>
-            <a:ext cx="987840" cy="448560"/>
+            <a:ext cx="987480" cy="448200"/>
           </a:xfrm>
           <a:prstGeom prst="rect">
             <a:avLst/>
@@ -17952,7 +17952,7 @@
         <p:spPr>
           <a:xfrm>
             <a:off x="0" y="1800"/>
-            <a:ext cx="9142560" cy="831240"/>
+            <a:ext cx="9142200" cy="830880"/>
           </a:xfrm>
           <a:prstGeom prst="rect">
             <a:avLst/>
@@ -18000,7 +18000,7 @@
         <p:spPr>
           <a:xfrm>
             <a:off x="954720" y="1199880"/>
-            <a:ext cx="6588000" cy="3142440"/>
+            <a:ext cx="6587640" cy="3142080"/>
           </a:xfrm>
           <a:prstGeom prst="rect">
             <a:avLst/>
@@ -18081,7 +18081,7 @@
         <p:spPr>
           <a:xfrm>
             <a:off x="899640" y="228960"/>
-            <a:ext cx="7343280" cy="363960"/>
+            <a:ext cx="7342920" cy="363600"/>
           </a:xfrm>
           <a:prstGeom prst="rect">
             <a:avLst/>
@@ -18133,7 +18133,7 @@
         <p:spPr>
           <a:xfrm>
             <a:off x="8279280" y="375120"/>
-            <a:ext cx="658080" cy="333000"/>
+            <a:ext cx="657720" cy="333000"/>
           </a:xfrm>
           <a:prstGeom prst="rect">
             <a:avLst/>
@@ -18206,7 +18206,7 @@
         <p:spPr>
           <a:xfrm>
             <a:off x="8279280" y="71280"/>
-            <a:ext cx="658080" cy="454680"/>
+            <a:ext cx="657720" cy="454680"/>
           </a:xfrm>
           <a:prstGeom prst="rect">
             <a:avLst/>
@@ -18350,7 +18350,7 @@
         <p:spPr>
           <a:xfrm>
             <a:off x="0" y="1800"/>
-            <a:ext cx="9142560" cy="5140440"/>
+            <a:ext cx="9142200" cy="5140080"/>
           </a:xfrm>
           <a:prstGeom prst="rect">
             <a:avLst/>
@@ -18373,7 +18373,7 @@
         <p:spPr>
           <a:xfrm>
             <a:off x="539640" y="411480"/>
-            <a:ext cx="1150560" cy="1123560"/>
+            <a:ext cx="1150200" cy="1123200"/>
           </a:xfrm>
           <a:prstGeom prst="rect">
             <a:avLst/>
@@ -18391,8 +18391,8 @@
         </p:nvSpPr>
         <p:spPr>
           <a:xfrm>
-            <a:off x="2267640" y="654120"/>
-            <a:ext cx="5255280" cy="638280"/>
+            <a:off x="2267640" y="790560"/>
+            <a:ext cx="5254920" cy="365040"/>
           </a:xfrm>
           <a:prstGeom prst="rect">
             <a:avLst/>
@@ -18427,20 +18427,7 @@
                 <a:latin typeface="Calibri"/>
                 <a:ea typeface="DejaVu Sans"/>
               </a:rPr>
-              <a:t>НАЗВАНИЕ</a:t>
-            </a:r>
-            <a:br>
-              <a:rPr sz="1800"/>
-            </a:br>
-            <a:r>
-              <a:rPr b="1" lang="ru-RU" sz="1800" spc="-1" strike="noStrike">
-                <a:solidFill>
-                  <a:srgbClr val="ffffff"/>
-                </a:solidFill>
-                <a:latin typeface="Calibri"/>
-                <a:ea typeface="DejaVu Sans"/>
-              </a:rPr>
-              <a:t>ИНДИВИДУАЛЬНОГО ПРОЕКТА</a:t>
+              <a:t>Mini (mini) framework for multiplayer games</a:t>
             </a:r>
             <a:endParaRPr b="0" lang="en-US" sz="1800" spc="-1" strike="noStrike">
               <a:latin typeface="Arial"/>
@@ -18457,7 +18444,7 @@
         <p:spPr>
           <a:xfrm>
             <a:off x="2267640" y="2355840"/>
-            <a:ext cx="5903280" cy="993600"/>
+            <a:ext cx="5902920" cy="993240"/>
           </a:xfrm>
           <a:prstGeom prst="rect">
             <a:avLst/>
@@ -18512,7 +18499,7 @@
         <p:spPr>
           <a:xfrm>
             <a:off x="2267640" y="3363840"/>
-            <a:ext cx="6551280" cy="1489680"/>
+            <a:ext cx="6550920" cy="1489680"/>
           </a:xfrm>
           <a:prstGeom prst="rect">
             <a:avLst/>

</xml_diff>